<commit_message>
review w7-s1 .. w7-s5
</commit_message>
<xml_diff>
--- a/w7/w7-s1-av-slide1.pptx
+++ b/w7/w7-s1-av-slide1.pptx
@@ -243,7 +243,7 @@
           <a:p>
             <a:fld id="{2D9D616D-B1D5-4DF0-A220-24114155C41E}" type="datetimeFigureOut">
               <a:rPr lang="en-US" smtClean="0"/>
-              <a:t>7/3/2018</a:t>
+              <a:t>7/6/18</a:t>
             </a:fld>
             <a:endParaRPr lang="en-US"/>
           </a:p>
@@ -285,7 +285,7 @@
           <a:p>
             <a:fld id="{064AFB5C-8519-4206-B7F9-11E423646794}" type="slidenum">
               <a:rPr lang="en-US" smtClean="0"/>
-              <a:t>‹N°›</a:t>
+              <a:t>‹#›</a:t>
             </a:fld>
             <a:endParaRPr lang="en-US"/>
           </a:p>
@@ -413,7 +413,7 @@
           <a:p>
             <a:fld id="{2D9D616D-B1D5-4DF0-A220-24114155C41E}" type="datetimeFigureOut">
               <a:rPr lang="en-US" smtClean="0"/>
-              <a:t>7/3/2018</a:t>
+              <a:t>7/6/18</a:t>
             </a:fld>
             <a:endParaRPr lang="en-US"/>
           </a:p>
@@ -455,7 +455,7 @@
           <a:p>
             <a:fld id="{064AFB5C-8519-4206-B7F9-11E423646794}" type="slidenum">
               <a:rPr lang="en-US" smtClean="0"/>
-              <a:t>‹N°›</a:t>
+              <a:t>‹#›</a:t>
             </a:fld>
             <a:endParaRPr lang="en-US"/>
           </a:p>
@@ -593,7 +593,7 @@
           <a:p>
             <a:fld id="{2D9D616D-B1D5-4DF0-A220-24114155C41E}" type="datetimeFigureOut">
               <a:rPr lang="en-US" smtClean="0"/>
-              <a:t>7/3/2018</a:t>
+              <a:t>7/6/18</a:t>
             </a:fld>
             <a:endParaRPr lang="en-US"/>
           </a:p>
@@ -635,7 +635,7 @@
           <a:p>
             <a:fld id="{064AFB5C-8519-4206-B7F9-11E423646794}" type="slidenum">
               <a:rPr lang="en-US" smtClean="0"/>
-              <a:t>‹N°›</a:t>
+              <a:t>‹#›</a:t>
             </a:fld>
             <a:endParaRPr lang="en-US"/>
           </a:p>
@@ -763,7 +763,7 @@
           <a:p>
             <a:fld id="{2D9D616D-B1D5-4DF0-A220-24114155C41E}" type="datetimeFigureOut">
               <a:rPr lang="en-US" smtClean="0"/>
-              <a:t>7/3/2018</a:t>
+              <a:t>7/6/18</a:t>
             </a:fld>
             <a:endParaRPr lang="en-US"/>
           </a:p>
@@ -805,7 +805,7 @@
           <a:p>
             <a:fld id="{064AFB5C-8519-4206-B7F9-11E423646794}" type="slidenum">
               <a:rPr lang="en-US" smtClean="0"/>
-              <a:t>‹N°›</a:t>
+              <a:t>‹#›</a:t>
             </a:fld>
             <a:endParaRPr lang="en-US"/>
           </a:p>
@@ -1009,7 +1009,7 @@
           <a:p>
             <a:fld id="{2D9D616D-B1D5-4DF0-A220-24114155C41E}" type="datetimeFigureOut">
               <a:rPr lang="en-US" smtClean="0"/>
-              <a:t>7/3/2018</a:t>
+              <a:t>7/6/18</a:t>
             </a:fld>
             <a:endParaRPr lang="en-US"/>
           </a:p>
@@ -1051,7 +1051,7 @@
           <a:p>
             <a:fld id="{064AFB5C-8519-4206-B7F9-11E423646794}" type="slidenum">
               <a:rPr lang="en-US" smtClean="0"/>
-              <a:t>‹N°›</a:t>
+              <a:t>‹#›</a:t>
             </a:fld>
             <a:endParaRPr lang="en-US"/>
           </a:p>
@@ -1241,7 +1241,7 @@
           <a:p>
             <a:fld id="{2D9D616D-B1D5-4DF0-A220-24114155C41E}" type="datetimeFigureOut">
               <a:rPr lang="en-US" smtClean="0"/>
-              <a:t>7/3/2018</a:t>
+              <a:t>7/6/18</a:t>
             </a:fld>
             <a:endParaRPr lang="en-US"/>
           </a:p>
@@ -1283,7 +1283,7 @@
           <a:p>
             <a:fld id="{064AFB5C-8519-4206-B7F9-11E423646794}" type="slidenum">
               <a:rPr lang="en-US" smtClean="0"/>
-              <a:t>‹N°›</a:t>
+              <a:t>‹#›</a:t>
             </a:fld>
             <a:endParaRPr lang="en-US"/>
           </a:p>
@@ -1608,7 +1608,7 @@
           <a:p>
             <a:fld id="{2D9D616D-B1D5-4DF0-A220-24114155C41E}" type="datetimeFigureOut">
               <a:rPr lang="en-US" smtClean="0"/>
-              <a:t>7/3/2018</a:t>
+              <a:t>7/6/18</a:t>
             </a:fld>
             <a:endParaRPr lang="en-US"/>
           </a:p>
@@ -1650,7 +1650,7 @@
           <a:p>
             <a:fld id="{064AFB5C-8519-4206-B7F9-11E423646794}" type="slidenum">
               <a:rPr lang="en-US" smtClean="0"/>
-              <a:t>‹N°›</a:t>
+              <a:t>‹#›</a:t>
             </a:fld>
             <a:endParaRPr lang="en-US"/>
           </a:p>
@@ -1726,7 +1726,7 @@
           <a:p>
             <a:fld id="{2D9D616D-B1D5-4DF0-A220-24114155C41E}" type="datetimeFigureOut">
               <a:rPr lang="en-US" smtClean="0"/>
-              <a:t>7/3/2018</a:t>
+              <a:t>7/6/18</a:t>
             </a:fld>
             <a:endParaRPr lang="en-US"/>
           </a:p>
@@ -1768,7 +1768,7 @@
           <a:p>
             <a:fld id="{064AFB5C-8519-4206-B7F9-11E423646794}" type="slidenum">
               <a:rPr lang="en-US" smtClean="0"/>
-              <a:t>‹N°›</a:t>
+              <a:t>‹#›</a:t>
             </a:fld>
             <a:endParaRPr lang="en-US"/>
           </a:p>
@@ -1821,7 +1821,7 @@
           <a:p>
             <a:fld id="{2D9D616D-B1D5-4DF0-A220-24114155C41E}" type="datetimeFigureOut">
               <a:rPr lang="en-US" smtClean="0"/>
-              <a:t>7/3/2018</a:t>
+              <a:t>7/6/18</a:t>
             </a:fld>
             <a:endParaRPr lang="en-US"/>
           </a:p>
@@ -1863,7 +1863,7 @@
           <a:p>
             <a:fld id="{064AFB5C-8519-4206-B7F9-11E423646794}" type="slidenum">
               <a:rPr lang="en-US" smtClean="0"/>
-              <a:t>‹N°›</a:t>
+              <a:t>‹#›</a:t>
             </a:fld>
             <a:endParaRPr lang="en-US"/>
           </a:p>
@@ -2098,7 +2098,7 @@
           <a:p>
             <a:fld id="{2D9D616D-B1D5-4DF0-A220-24114155C41E}" type="datetimeFigureOut">
               <a:rPr lang="en-US" smtClean="0"/>
-              <a:t>7/3/2018</a:t>
+              <a:t>7/6/18</a:t>
             </a:fld>
             <a:endParaRPr lang="en-US"/>
           </a:p>
@@ -2140,7 +2140,7 @@
           <a:p>
             <a:fld id="{064AFB5C-8519-4206-B7F9-11E423646794}" type="slidenum">
               <a:rPr lang="en-US" smtClean="0"/>
-              <a:t>‹N°›</a:t>
+              <a:t>‹#›</a:t>
             </a:fld>
             <a:endParaRPr lang="en-US"/>
           </a:p>
@@ -2351,7 +2351,7 @@
           <a:p>
             <a:fld id="{2D9D616D-B1D5-4DF0-A220-24114155C41E}" type="datetimeFigureOut">
               <a:rPr lang="en-US" smtClean="0"/>
-              <a:t>7/3/2018</a:t>
+              <a:t>7/6/18</a:t>
             </a:fld>
             <a:endParaRPr lang="en-US"/>
           </a:p>
@@ -2393,7 +2393,7 @@
           <a:p>
             <a:fld id="{064AFB5C-8519-4206-B7F9-11E423646794}" type="slidenum">
               <a:rPr lang="en-US" smtClean="0"/>
-              <a:t>‹N°›</a:t>
+              <a:t>‹#›</a:t>
             </a:fld>
             <a:endParaRPr lang="en-US"/>
           </a:p>
@@ -2564,7 +2564,7 @@
           <a:p>
             <a:fld id="{2D9D616D-B1D5-4DF0-A220-24114155C41E}" type="datetimeFigureOut">
               <a:rPr lang="en-US" smtClean="0"/>
-              <a:t>7/3/2018</a:t>
+              <a:t>7/6/18</a:t>
             </a:fld>
             <a:endParaRPr lang="en-US"/>
           </a:p>
@@ -2642,7 +2642,7 @@
           <a:p>
             <a:fld id="{064AFB5C-8519-4206-B7F9-11E423646794}" type="slidenum">
               <a:rPr lang="en-US" smtClean="0"/>
-              <a:t>‹N°›</a:t>
+              <a:t>‹#›</a:t>
             </a:fld>
             <a:endParaRPr lang="en-US"/>
           </a:p>
@@ -3005,7 +3005,9 @@
               </a:srgbClr>
             </a:solidFill>
             <a:ln>
-              <a:noFill/>
+              <a:solidFill>
+                <a:schemeClr val="tx1"/>
+              </a:solidFill>
             </a:ln>
           </p:spPr>
           <p:style>
@@ -3108,7 +3110,9 @@
               </a:srgbClr>
             </a:solidFill>
             <a:ln>
-              <a:noFill/>
+              <a:solidFill>
+                <a:schemeClr val="tx1"/>
+              </a:solidFill>
             </a:ln>
           </p:spPr>
           <p:style>
@@ -3175,109 +3179,96 @@
           </p:txBody>
         </p:sp>
       </p:grpSp>
-      <p:grpSp>
-        <p:nvGrpSpPr>
-          <p:cNvPr id="16" name="Groupe 15"/>
-          <p:cNvGrpSpPr/>
+      <p:sp>
+        <p:nvSpPr>
+          <p:cNvPr id="6" name="Ellipse 5"/>
+          <p:cNvSpPr>
+            <a:spLocks noChangeAspect="1"/>
+          </p:cNvSpPr>
           <p:nvPr/>
-        </p:nvGrpSpPr>
-        <p:grpSpPr>
+        </p:nvSpPr>
+        <p:spPr>
           <a:xfrm>
             <a:off x="1295753" y="2003155"/>
             <a:ext cx="4813855" cy="4813855"/>
-            <a:chOff x="1295753" y="2003155"/>
-            <a:chExt cx="4813855" cy="4813855"/>
           </a:xfrm>
-        </p:grpSpPr>
-        <p:sp>
-          <p:nvSpPr>
-            <p:cNvPr id="6" name="Ellipse 5"/>
-            <p:cNvSpPr>
-              <a:spLocks noChangeAspect="1"/>
-            </p:cNvSpPr>
-            <p:nvPr/>
-          </p:nvSpPr>
-          <p:spPr>
-            <a:xfrm>
-              <a:off x="1295753" y="2003155"/>
-              <a:ext cx="4813855" cy="4813855"/>
-            </a:xfrm>
-            <a:prstGeom prst="ellipse">
-              <a:avLst/>
-            </a:prstGeom>
+          <a:prstGeom prst="ellipse">
+            <a:avLst/>
+          </a:prstGeom>
+          <a:solidFill>
+            <a:srgbClr val="C44E52">
+              <a:alpha val="70000"/>
+            </a:srgbClr>
+          </a:solidFill>
+          <a:ln>
             <a:solidFill>
-              <a:srgbClr val="C44E52">
-                <a:alpha val="70000"/>
-              </a:srgbClr>
+              <a:schemeClr val="tx1"/>
             </a:solidFill>
-            <a:ln>
-              <a:noFill/>
-            </a:ln>
-          </p:spPr>
-          <p:style>
-            <a:lnRef idx="2">
-              <a:schemeClr val="accent1">
-                <a:shade val="50000"/>
-              </a:schemeClr>
-            </a:lnRef>
-            <a:fillRef idx="1">
-              <a:schemeClr val="accent1"/>
-            </a:fillRef>
-            <a:effectRef idx="0">
-              <a:schemeClr val="accent1"/>
-            </a:effectRef>
-            <a:fontRef idx="minor">
-              <a:schemeClr val="lt1"/>
-            </a:fontRef>
-          </p:style>
-          <p:txBody>
-            <a:bodyPr rtlCol="0" anchor="ctr"/>
-            <a:lstStyle/>
-            <a:p>
-              <a:pPr algn="ctr"/>
-              <a:endParaRPr lang="en-US" sz="3000"/>
-            </a:p>
-          </p:txBody>
-        </p:sp>
-        <p:sp>
-          <p:nvSpPr>
-            <p:cNvPr id="9" name="ZoneTexte 8"/>
-            <p:cNvSpPr txBox="1"/>
-            <p:nvPr/>
-          </p:nvSpPr>
-          <p:spPr>
-            <a:xfrm>
-              <a:off x="2018338" y="5402813"/>
-              <a:ext cx="3537636" cy="553998"/>
-            </a:xfrm>
-            <a:prstGeom prst="rect">
-              <a:avLst/>
-            </a:prstGeom>
-            <a:noFill/>
-          </p:spPr>
-          <p:txBody>
-            <a:bodyPr wrap="square" rtlCol="0">
-              <a:spAutoFit/>
-            </a:bodyPr>
-            <a:lstStyle/>
-            <a:p>
-              <a:r>
-                <a:rPr lang="fr-FR" sz="3000" b="1" dirty="0" smtClean="0">
-                  <a:solidFill>
-                    <a:schemeClr val="bg1"/>
-                  </a:solidFill>
-                </a:rPr>
-                <a:t>Expertise domaine</a:t>
-              </a:r>
-              <a:endParaRPr lang="fr-FR" sz="3000" b="1" dirty="0">
+          </a:ln>
+        </p:spPr>
+        <p:style>
+          <a:lnRef idx="2">
+            <a:schemeClr val="accent1">
+              <a:shade val="50000"/>
+            </a:schemeClr>
+          </a:lnRef>
+          <a:fillRef idx="1">
+            <a:schemeClr val="accent1"/>
+          </a:fillRef>
+          <a:effectRef idx="0">
+            <a:schemeClr val="accent1"/>
+          </a:effectRef>
+          <a:fontRef idx="minor">
+            <a:schemeClr val="lt1"/>
+          </a:fontRef>
+        </p:style>
+        <p:txBody>
+          <a:bodyPr rtlCol="0" anchor="ctr"/>
+          <a:lstStyle/>
+          <a:p>
+            <a:pPr algn="ctr"/>
+            <a:endParaRPr lang="en-US" sz="3000"/>
+          </a:p>
+        </p:txBody>
+      </p:sp>
+      <p:sp>
+        <p:nvSpPr>
+          <p:cNvPr id="9" name="ZoneTexte 8"/>
+          <p:cNvSpPr txBox="1"/>
+          <p:nvPr/>
+        </p:nvSpPr>
+        <p:spPr>
+          <a:xfrm>
+            <a:off x="2018338" y="5402813"/>
+            <a:ext cx="3537636" cy="553998"/>
+          </a:xfrm>
+          <a:prstGeom prst="rect">
+            <a:avLst/>
+          </a:prstGeom>
+          <a:noFill/>
+        </p:spPr>
+        <p:txBody>
+          <a:bodyPr wrap="square" rtlCol="0">
+            <a:spAutoFit/>
+          </a:bodyPr>
+          <a:lstStyle/>
+          <a:p>
+            <a:r>
+              <a:rPr lang="fr-FR" sz="3000" b="1" dirty="0" smtClean="0">
                 <a:solidFill>
                   <a:schemeClr val="bg1"/>
                 </a:solidFill>
-              </a:endParaRPr>
-            </a:p>
-          </p:txBody>
-        </p:sp>
-      </p:grpSp>
+              </a:rPr>
+              <a:t>Expertise domaine</a:t>
+            </a:r>
+            <a:endParaRPr lang="fr-FR" sz="3000" b="1" dirty="0">
+              <a:solidFill>
+                <a:schemeClr val="bg1"/>
+              </a:solidFill>
+            </a:endParaRPr>
+          </a:p>
+        </p:txBody>
+      </p:sp>
       <p:sp>
         <p:nvSpPr>
           <p:cNvPr id="10" name="ZoneTexte 9"/>
@@ -3627,7 +3618,7 @@
                             </p:stCondLst>
                             <p:childTnLst>
                               <p:par>
-                                <p:cTn id="15" presetID="10" presetClass="entr" presetSubtype="0" fill="hold" nodeType="clickEffect">
+                                <p:cTn id="15" presetID="10" presetClass="entr" presetSubtype="0" fill="hold" grpId="0" nodeType="clickEffect">
                                   <p:stCondLst>
                                     <p:cond delay="0"/>
                                   </p:stCondLst>
@@ -3640,7 +3631,7 @@
                                           </p:stCondLst>
                                         </p:cTn>
                                         <p:tgtEl>
-                                          <p:spTgt spid="16"/>
+                                          <p:spTgt spid="12"/>
                                         </p:tgtEl>
                                         <p:attrNameLst>
                                           <p:attrName>style.visibility</p:attrName>
@@ -3654,7 +3645,7 @@
                                       <p:cBhvr>
                                         <p:cTn id="17" dur="500"/>
                                         <p:tgtEl>
-                                          <p:spTgt spid="16"/>
+                                          <p:spTgt spid="12"/>
                                         </p:tgtEl>
                                       </p:cBhvr>
                                     </p:animEffect>
@@ -3693,7 +3684,7 @@
                                           </p:stCondLst>
                                         </p:cTn>
                                         <p:tgtEl>
-                                          <p:spTgt spid="12"/>
+                                          <p:spTgt spid="11"/>
                                         </p:tgtEl>
                                         <p:attrNameLst>
                                           <p:attrName>style.visibility</p:attrName>
@@ -3707,7 +3698,7 @@
                                       <p:cBhvr>
                                         <p:cTn id="22" dur="500"/>
                                         <p:tgtEl>
-                                          <p:spTgt spid="12"/>
+                                          <p:spTgt spid="11"/>
                                         </p:tgtEl>
                                       </p:cBhvr>
                                     </p:animEffect>
@@ -3746,7 +3737,7 @@
                                           </p:stCondLst>
                                         </p:cTn>
                                         <p:tgtEl>
-                                          <p:spTgt spid="11"/>
+                                          <p:spTgt spid="10"/>
                                         </p:tgtEl>
                                         <p:attrNameLst>
                                           <p:attrName>style.visibility</p:attrName>
@@ -3760,7 +3751,7 @@
                                       <p:cBhvr>
                                         <p:cTn id="27" dur="500"/>
                                         <p:tgtEl>
-                                          <p:spTgt spid="11"/>
+                                          <p:spTgt spid="10"/>
                                         </p:tgtEl>
                                       </p:cBhvr>
                                     </p:animEffect>
@@ -3799,7 +3790,7 @@
                                           </p:stCondLst>
                                         </p:cTn>
                                         <p:tgtEl>
-                                          <p:spTgt spid="10"/>
+                                          <p:spTgt spid="13"/>
                                         </p:tgtEl>
                                         <p:attrNameLst>
                                           <p:attrName>style.visibility</p:attrName>
@@ -3812,59 +3803,6 @@
                                     <p:animEffect transition="in" filter="fade">
                                       <p:cBhvr>
                                         <p:cTn id="32" dur="500"/>
-                                        <p:tgtEl>
-                                          <p:spTgt spid="10"/>
-                                        </p:tgtEl>
-                                      </p:cBhvr>
-                                    </p:animEffect>
-                                  </p:childTnLst>
-                                </p:cTn>
-                              </p:par>
-                            </p:childTnLst>
-                          </p:cTn>
-                        </p:par>
-                      </p:childTnLst>
-                    </p:cTn>
-                  </p:par>
-                  <p:par>
-                    <p:cTn id="33" fill="hold">
-                      <p:stCondLst>
-                        <p:cond delay="indefinite"/>
-                      </p:stCondLst>
-                      <p:childTnLst>
-                        <p:par>
-                          <p:cTn id="34" fill="hold">
-                            <p:stCondLst>
-                              <p:cond delay="0"/>
-                            </p:stCondLst>
-                            <p:childTnLst>
-                              <p:par>
-                                <p:cTn id="35" presetID="10" presetClass="entr" presetSubtype="0" fill="hold" grpId="0" nodeType="clickEffect">
-                                  <p:stCondLst>
-                                    <p:cond delay="0"/>
-                                  </p:stCondLst>
-                                  <p:childTnLst>
-                                    <p:set>
-                                      <p:cBhvr>
-                                        <p:cTn id="36" dur="1" fill="hold">
-                                          <p:stCondLst>
-                                            <p:cond delay="0"/>
-                                          </p:stCondLst>
-                                        </p:cTn>
-                                        <p:tgtEl>
-                                          <p:spTgt spid="13"/>
-                                        </p:tgtEl>
-                                        <p:attrNameLst>
-                                          <p:attrName>style.visibility</p:attrName>
-                                        </p:attrNameLst>
-                                      </p:cBhvr>
-                                      <p:to>
-                                        <p:strVal val="visible"/>
-                                      </p:to>
-                                    </p:set>
-                                    <p:animEffect transition="in" filter="fade">
-                                      <p:cBhvr>
-                                        <p:cTn id="37" dur="500"/>
                                         <p:tgtEl>
                                           <p:spTgt spid="13"/>
                                         </p:tgtEl>

</xml_diff>

<commit_message>
passe sur les commentaires de thierry
</commit_message>
<xml_diff>
--- a/w7/w7-s1-av-slide1.pptx
+++ b/w7/w7-s1-av-slide1.pptx
@@ -243,7 +243,7 @@
           <a:p>
             <a:fld id="{2D9D616D-B1D5-4DF0-A220-24114155C41E}" type="datetimeFigureOut">
               <a:rPr lang="en-US" smtClean="0"/>
-              <a:t>7/6/18</a:t>
+              <a:t>7/6/2018</a:t>
             </a:fld>
             <a:endParaRPr lang="en-US"/>
           </a:p>
@@ -285,7 +285,7 @@
           <a:p>
             <a:fld id="{064AFB5C-8519-4206-B7F9-11E423646794}" type="slidenum">
               <a:rPr lang="en-US" smtClean="0"/>
-              <a:t>‹#›</a:t>
+              <a:t>‹N°›</a:t>
             </a:fld>
             <a:endParaRPr lang="en-US"/>
           </a:p>
@@ -413,7 +413,7 @@
           <a:p>
             <a:fld id="{2D9D616D-B1D5-4DF0-A220-24114155C41E}" type="datetimeFigureOut">
               <a:rPr lang="en-US" smtClean="0"/>
-              <a:t>7/6/18</a:t>
+              <a:t>7/6/2018</a:t>
             </a:fld>
             <a:endParaRPr lang="en-US"/>
           </a:p>
@@ -455,7 +455,7 @@
           <a:p>
             <a:fld id="{064AFB5C-8519-4206-B7F9-11E423646794}" type="slidenum">
               <a:rPr lang="en-US" smtClean="0"/>
-              <a:t>‹#›</a:t>
+              <a:t>‹N°›</a:t>
             </a:fld>
             <a:endParaRPr lang="en-US"/>
           </a:p>
@@ -593,7 +593,7 @@
           <a:p>
             <a:fld id="{2D9D616D-B1D5-4DF0-A220-24114155C41E}" type="datetimeFigureOut">
               <a:rPr lang="en-US" smtClean="0"/>
-              <a:t>7/6/18</a:t>
+              <a:t>7/6/2018</a:t>
             </a:fld>
             <a:endParaRPr lang="en-US"/>
           </a:p>
@@ -635,7 +635,7 @@
           <a:p>
             <a:fld id="{064AFB5C-8519-4206-B7F9-11E423646794}" type="slidenum">
               <a:rPr lang="en-US" smtClean="0"/>
-              <a:t>‹#›</a:t>
+              <a:t>‹N°›</a:t>
             </a:fld>
             <a:endParaRPr lang="en-US"/>
           </a:p>
@@ -763,7 +763,7 @@
           <a:p>
             <a:fld id="{2D9D616D-B1D5-4DF0-A220-24114155C41E}" type="datetimeFigureOut">
               <a:rPr lang="en-US" smtClean="0"/>
-              <a:t>7/6/18</a:t>
+              <a:t>7/6/2018</a:t>
             </a:fld>
             <a:endParaRPr lang="en-US"/>
           </a:p>
@@ -805,7 +805,7 @@
           <a:p>
             <a:fld id="{064AFB5C-8519-4206-B7F9-11E423646794}" type="slidenum">
               <a:rPr lang="en-US" smtClean="0"/>
-              <a:t>‹#›</a:t>
+              <a:t>‹N°›</a:t>
             </a:fld>
             <a:endParaRPr lang="en-US"/>
           </a:p>
@@ -1009,7 +1009,7 @@
           <a:p>
             <a:fld id="{2D9D616D-B1D5-4DF0-A220-24114155C41E}" type="datetimeFigureOut">
               <a:rPr lang="en-US" smtClean="0"/>
-              <a:t>7/6/18</a:t>
+              <a:t>7/6/2018</a:t>
             </a:fld>
             <a:endParaRPr lang="en-US"/>
           </a:p>
@@ -1051,7 +1051,7 @@
           <a:p>
             <a:fld id="{064AFB5C-8519-4206-B7F9-11E423646794}" type="slidenum">
               <a:rPr lang="en-US" smtClean="0"/>
-              <a:t>‹#›</a:t>
+              <a:t>‹N°›</a:t>
             </a:fld>
             <a:endParaRPr lang="en-US"/>
           </a:p>
@@ -1241,7 +1241,7 @@
           <a:p>
             <a:fld id="{2D9D616D-B1D5-4DF0-A220-24114155C41E}" type="datetimeFigureOut">
               <a:rPr lang="en-US" smtClean="0"/>
-              <a:t>7/6/18</a:t>
+              <a:t>7/6/2018</a:t>
             </a:fld>
             <a:endParaRPr lang="en-US"/>
           </a:p>
@@ -1283,7 +1283,7 @@
           <a:p>
             <a:fld id="{064AFB5C-8519-4206-B7F9-11E423646794}" type="slidenum">
               <a:rPr lang="en-US" smtClean="0"/>
-              <a:t>‹#›</a:t>
+              <a:t>‹N°›</a:t>
             </a:fld>
             <a:endParaRPr lang="en-US"/>
           </a:p>
@@ -1608,7 +1608,7 @@
           <a:p>
             <a:fld id="{2D9D616D-B1D5-4DF0-A220-24114155C41E}" type="datetimeFigureOut">
               <a:rPr lang="en-US" smtClean="0"/>
-              <a:t>7/6/18</a:t>
+              <a:t>7/6/2018</a:t>
             </a:fld>
             <a:endParaRPr lang="en-US"/>
           </a:p>
@@ -1650,7 +1650,7 @@
           <a:p>
             <a:fld id="{064AFB5C-8519-4206-B7F9-11E423646794}" type="slidenum">
               <a:rPr lang="en-US" smtClean="0"/>
-              <a:t>‹#›</a:t>
+              <a:t>‹N°›</a:t>
             </a:fld>
             <a:endParaRPr lang="en-US"/>
           </a:p>
@@ -1726,7 +1726,7 @@
           <a:p>
             <a:fld id="{2D9D616D-B1D5-4DF0-A220-24114155C41E}" type="datetimeFigureOut">
               <a:rPr lang="en-US" smtClean="0"/>
-              <a:t>7/6/18</a:t>
+              <a:t>7/6/2018</a:t>
             </a:fld>
             <a:endParaRPr lang="en-US"/>
           </a:p>
@@ -1768,7 +1768,7 @@
           <a:p>
             <a:fld id="{064AFB5C-8519-4206-B7F9-11E423646794}" type="slidenum">
               <a:rPr lang="en-US" smtClean="0"/>
-              <a:t>‹#›</a:t>
+              <a:t>‹N°›</a:t>
             </a:fld>
             <a:endParaRPr lang="en-US"/>
           </a:p>
@@ -1821,7 +1821,7 @@
           <a:p>
             <a:fld id="{2D9D616D-B1D5-4DF0-A220-24114155C41E}" type="datetimeFigureOut">
               <a:rPr lang="en-US" smtClean="0"/>
-              <a:t>7/6/18</a:t>
+              <a:t>7/6/2018</a:t>
             </a:fld>
             <a:endParaRPr lang="en-US"/>
           </a:p>
@@ -1863,7 +1863,7 @@
           <a:p>
             <a:fld id="{064AFB5C-8519-4206-B7F9-11E423646794}" type="slidenum">
               <a:rPr lang="en-US" smtClean="0"/>
-              <a:t>‹#›</a:t>
+              <a:t>‹N°›</a:t>
             </a:fld>
             <a:endParaRPr lang="en-US"/>
           </a:p>
@@ -2098,7 +2098,7 @@
           <a:p>
             <a:fld id="{2D9D616D-B1D5-4DF0-A220-24114155C41E}" type="datetimeFigureOut">
               <a:rPr lang="en-US" smtClean="0"/>
-              <a:t>7/6/18</a:t>
+              <a:t>7/6/2018</a:t>
             </a:fld>
             <a:endParaRPr lang="en-US"/>
           </a:p>
@@ -2140,7 +2140,7 @@
           <a:p>
             <a:fld id="{064AFB5C-8519-4206-B7F9-11E423646794}" type="slidenum">
               <a:rPr lang="en-US" smtClean="0"/>
-              <a:t>‹#›</a:t>
+              <a:t>‹N°›</a:t>
             </a:fld>
             <a:endParaRPr lang="en-US"/>
           </a:p>
@@ -2351,7 +2351,7 @@
           <a:p>
             <a:fld id="{2D9D616D-B1D5-4DF0-A220-24114155C41E}" type="datetimeFigureOut">
               <a:rPr lang="en-US" smtClean="0"/>
-              <a:t>7/6/18</a:t>
+              <a:t>7/6/2018</a:t>
             </a:fld>
             <a:endParaRPr lang="en-US"/>
           </a:p>
@@ -2393,7 +2393,7 @@
           <a:p>
             <a:fld id="{064AFB5C-8519-4206-B7F9-11E423646794}" type="slidenum">
               <a:rPr lang="en-US" smtClean="0"/>
-              <a:t>‹#›</a:t>
+              <a:t>‹N°›</a:t>
             </a:fld>
             <a:endParaRPr lang="en-US"/>
           </a:p>
@@ -2564,7 +2564,7 @@
           <a:p>
             <a:fld id="{2D9D616D-B1D5-4DF0-A220-24114155C41E}" type="datetimeFigureOut">
               <a:rPr lang="en-US" smtClean="0"/>
-              <a:t>7/6/18</a:t>
+              <a:t>7/6/2018</a:t>
             </a:fld>
             <a:endParaRPr lang="en-US"/>
           </a:p>
@@ -2642,7 +2642,7 @@
           <a:p>
             <a:fld id="{064AFB5C-8519-4206-B7F9-11E423646794}" type="slidenum">
               <a:rPr lang="en-US" smtClean="0"/>
-              <a:t>‹#›</a:t>
+              <a:t>‹N°›</a:t>
             </a:fld>
             <a:endParaRPr lang="en-US"/>
           </a:p>
@@ -3631,7 +3631,7 @@
                                           </p:stCondLst>
                                         </p:cTn>
                                         <p:tgtEl>
-                                          <p:spTgt spid="12"/>
+                                          <p:spTgt spid="6"/>
                                         </p:tgtEl>
                                         <p:attrNameLst>
                                           <p:attrName>style.visibility</p:attrName>
@@ -3645,7 +3645,7 @@
                                       <p:cBhvr>
                                         <p:cTn id="17" dur="500"/>
                                         <p:tgtEl>
-                                          <p:spTgt spid="12"/>
+                                          <p:spTgt spid="6"/>
                                         </p:tgtEl>
                                       </p:cBhvr>
                                     </p:animEffect>
@@ -3684,7 +3684,7 @@
                                           </p:stCondLst>
                                         </p:cTn>
                                         <p:tgtEl>
-                                          <p:spTgt spid="11"/>
+                                          <p:spTgt spid="12"/>
                                         </p:tgtEl>
                                         <p:attrNameLst>
                                           <p:attrName>style.visibility</p:attrName>
@@ -3698,7 +3698,7 @@
                                       <p:cBhvr>
                                         <p:cTn id="22" dur="500"/>
                                         <p:tgtEl>
-                                          <p:spTgt spid="11"/>
+                                          <p:spTgt spid="12"/>
                                         </p:tgtEl>
                                       </p:cBhvr>
                                     </p:animEffect>
@@ -3737,7 +3737,7 @@
                                           </p:stCondLst>
                                         </p:cTn>
                                         <p:tgtEl>
-                                          <p:spTgt spid="10"/>
+                                          <p:spTgt spid="11"/>
                                         </p:tgtEl>
                                         <p:attrNameLst>
                                           <p:attrName>style.visibility</p:attrName>
@@ -3751,7 +3751,7 @@
                                       <p:cBhvr>
                                         <p:cTn id="27" dur="500"/>
                                         <p:tgtEl>
-                                          <p:spTgt spid="10"/>
+                                          <p:spTgt spid="11"/>
                                         </p:tgtEl>
                                       </p:cBhvr>
                                     </p:animEffect>
@@ -3790,6 +3790,59 @@
                                           </p:stCondLst>
                                         </p:cTn>
                                         <p:tgtEl>
+                                          <p:spTgt spid="10"/>
+                                        </p:tgtEl>
+                                        <p:attrNameLst>
+                                          <p:attrName>style.visibility</p:attrName>
+                                        </p:attrNameLst>
+                                      </p:cBhvr>
+                                      <p:to>
+                                        <p:strVal val="visible"/>
+                                      </p:to>
+                                    </p:set>
+                                    <p:animEffect transition="in" filter="fade">
+                                      <p:cBhvr>
+                                        <p:cTn id="32" dur="500"/>
+                                        <p:tgtEl>
+                                          <p:spTgt spid="10"/>
+                                        </p:tgtEl>
+                                      </p:cBhvr>
+                                    </p:animEffect>
+                                  </p:childTnLst>
+                                </p:cTn>
+                              </p:par>
+                            </p:childTnLst>
+                          </p:cTn>
+                        </p:par>
+                      </p:childTnLst>
+                    </p:cTn>
+                  </p:par>
+                  <p:par>
+                    <p:cTn id="33" fill="hold">
+                      <p:stCondLst>
+                        <p:cond delay="indefinite"/>
+                      </p:stCondLst>
+                      <p:childTnLst>
+                        <p:par>
+                          <p:cTn id="34" fill="hold">
+                            <p:stCondLst>
+                              <p:cond delay="0"/>
+                            </p:stCondLst>
+                            <p:childTnLst>
+                              <p:par>
+                                <p:cTn id="35" presetID="10" presetClass="entr" presetSubtype="0" fill="hold" grpId="0" nodeType="clickEffect">
+                                  <p:stCondLst>
+                                    <p:cond delay="0"/>
+                                  </p:stCondLst>
+                                  <p:childTnLst>
+                                    <p:set>
+                                      <p:cBhvr>
+                                        <p:cTn id="36" dur="1" fill="hold">
+                                          <p:stCondLst>
+                                            <p:cond delay="0"/>
+                                          </p:stCondLst>
+                                        </p:cTn>
+                                        <p:tgtEl>
                                           <p:spTgt spid="13"/>
                                         </p:tgtEl>
                                         <p:attrNameLst>
@@ -3802,7 +3855,7 @@
                                     </p:set>
                                     <p:animEffect transition="in" filter="fade">
                                       <p:cBhvr>
-                                        <p:cTn id="32" dur="500"/>
+                                        <p:cTn id="37" dur="500"/>
                                         <p:tgtEl>
                                           <p:spTgt spid="13"/>
                                         </p:tgtEl>
@@ -3839,6 +3892,7 @@
       </p:par>
     </p:tnLst>
     <p:bldLst>
+      <p:bldP spid="6" grpId="0" animBg="1"/>
       <p:bldP spid="10" grpId="0"/>
       <p:bldP spid="11" grpId="0"/>
       <p:bldP spid="12" grpId="0"/>

</xml_diff>

<commit_message>
minor improvements to the slides
</commit_message>
<xml_diff>
--- a/w7/w7-s1-av-slide1.pptx
+++ b/w7/w7-s1-av-slide1.pptx
@@ -6,6 +6,7 @@
   </p:sldMasterIdLst>
   <p:sldIdLst>
     <p:sldId id="256" r:id="rId2"/>
+    <p:sldId id="257" r:id="rId3"/>
   </p:sldIdLst>
   <p:sldSz cx="12192000" cy="6858000"/>
   <p:notesSz cx="6858000" cy="9144000"/>
@@ -243,7 +244,7 @@
           <a:p>
             <a:fld id="{2D9D616D-B1D5-4DF0-A220-24114155C41E}" type="datetimeFigureOut">
               <a:rPr lang="en-US" smtClean="0"/>
-              <a:t>7/6/2018</a:t>
+              <a:t>7/10/2018</a:t>
             </a:fld>
             <a:endParaRPr lang="en-US"/>
           </a:p>
@@ -413,7 +414,7 @@
           <a:p>
             <a:fld id="{2D9D616D-B1D5-4DF0-A220-24114155C41E}" type="datetimeFigureOut">
               <a:rPr lang="en-US" smtClean="0"/>
-              <a:t>7/6/2018</a:t>
+              <a:t>7/10/2018</a:t>
             </a:fld>
             <a:endParaRPr lang="en-US"/>
           </a:p>
@@ -593,7 +594,7 @@
           <a:p>
             <a:fld id="{2D9D616D-B1D5-4DF0-A220-24114155C41E}" type="datetimeFigureOut">
               <a:rPr lang="en-US" smtClean="0"/>
-              <a:t>7/6/2018</a:t>
+              <a:t>7/10/2018</a:t>
             </a:fld>
             <a:endParaRPr lang="en-US"/>
           </a:p>
@@ -763,7 +764,7 @@
           <a:p>
             <a:fld id="{2D9D616D-B1D5-4DF0-A220-24114155C41E}" type="datetimeFigureOut">
               <a:rPr lang="en-US" smtClean="0"/>
-              <a:t>7/6/2018</a:t>
+              <a:t>7/10/2018</a:t>
             </a:fld>
             <a:endParaRPr lang="en-US"/>
           </a:p>
@@ -1009,7 +1010,7 @@
           <a:p>
             <a:fld id="{2D9D616D-B1D5-4DF0-A220-24114155C41E}" type="datetimeFigureOut">
               <a:rPr lang="en-US" smtClean="0"/>
-              <a:t>7/6/2018</a:t>
+              <a:t>7/10/2018</a:t>
             </a:fld>
             <a:endParaRPr lang="en-US"/>
           </a:p>
@@ -1241,7 +1242,7 @@
           <a:p>
             <a:fld id="{2D9D616D-B1D5-4DF0-A220-24114155C41E}" type="datetimeFigureOut">
               <a:rPr lang="en-US" smtClean="0"/>
-              <a:t>7/6/2018</a:t>
+              <a:t>7/10/2018</a:t>
             </a:fld>
             <a:endParaRPr lang="en-US"/>
           </a:p>
@@ -1608,7 +1609,7 @@
           <a:p>
             <a:fld id="{2D9D616D-B1D5-4DF0-A220-24114155C41E}" type="datetimeFigureOut">
               <a:rPr lang="en-US" smtClean="0"/>
-              <a:t>7/6/2018</a:t>
+              <a:t>7/10/2018</a:t>
             </a:fld>
             <a:endParaRPr lang="en-US"/>
           </a:p>
@@ -1726,7 +1727,7 @@
           <a:p>
             <a:fld id="{2D9D616D-B1D5-4DF0-A220-24114155C41E}" type="datetimeFigureOut">
               <a:rPr lang="en-US" smtClean="0"/>
-              <a:t>7/6/2018</a:t>
+              <a:t>7/10/2018</a:t>
             </a:fld>
             <a:endParaRPr lang="en-US"/>
           </a:p>
@@ -1821,7 +1822,7 @@
           <a:p>
             <a:fld id="{2D9D616D-B1D5-4DF0-A220-24114155C41E}" type="datetimeFigureOut">
               <a:rPr lang="en-US" smtClean="0"/>
-              <a:t>7/6/2018</a:t>
+              <a:t>7/10/2018</a:t>
             </a:fld>
             <a:endParaRPr lang="en-US"/>
           </a:p>
@@ -2098,7 +2099,7 @@
           <a:p>
             <a:fld id="{2D9D616D-B1D5-4DF0-A220-24114155C41E}" type="datetimeFigureOut">
               <a:rPr lang="en-US" smtClean="0"/>
-              <a:t>7/6/2018</a:t>
+              <a:t>7/10/2018</a:t>
             </a:fld>
             <a:endParaRPr lang="en-US"/>
           </a:p>
@@ -2351,7 +2352,7 @@
           <a:p>
             <a:fld id="{2D9D616D-B1D5-4DF0-A220-24114155C41E}" type="datetimeFigureOut">
               <a:rPr lang="en-US" smtClean="0"/>
-              <a:t>7/6/2018</a:t>
+              <a:t>7/10/2018</a:t>
             </a:fld>
             <a:endParaRPr lang="en-US"/>
           </a:p>
@@ -2564,7 +2565,7 @@
           <a:p>
             <a:fld id="{2D9D616D-B1D5-4DF0-A220-24114155C41E}" type="datetimeFigureOut">
               <a:rPr lang="en-US" smtClean="0"/>
-              <a:t>7/6/2018</a:t>
+              <a:t>7/10/2018</a:t>
             </a:fld>
             <a:endParaRPr lang="en-US"/>
           </a:p>
@@ -3546,6 +3547,76 @@
                                   </p:childTnLst>
                                 </p:cTn>
                               </p:par>
+                              <p:par>
+                                <p:cTn id="8" presetID="10" presetClass="entr" presetSubtype="0" fill="hold" nodeType="withEffect">
+                                  <p:stCondLst>
+                                    <p:cond delay="0"/>
+                                  </p:stCondLst>
+                                  <p:childTnLst>
+                                    <p:set>
+                                      <p:cBhvr>
+                                        <p:cTn id="9" dur="1" fill="hold">
+                                          <p:stCondLst>
+                                            <p:cond delay="0"/>
+                                          </p:stCondLst>
+                                        </p:cTn>
+                                        <p:tgtEl>
+                                          <p:spTgt spid="17"/>
+                                        </p:tgtEl>
+                                        <p:attrNameLst>
+                                          <p:attrName>style.visibility</p:attrName>
+                                        </p:attrNameLst>
+                                      </p:cBhvr>
+                                      <p:to>
+                                        <p:strVal val="visible"/>
+                                      </p:to>
+                                    </p:set>
+                                    <p:animEffect transition="in" filter="fade">
+                                      <p:cBhvr>
+                                        <p:cTn id="10" dur="500"/>
+                                        <p:tgtEl>
+                                          <p:spTgt spid="17"/>
+                                        </p:tgtEl>
+                                      </p:cBhvr>
+                                    </p:animEffect>
+                                  </p:childTnLst>
+                                </p:cTn>
+                              </p:par>
+                              <p:par>
+                                <p:cTn id="11" presetID="10" presetClass="entr" presetSubtype="0" fill="hold" grpId="0" nodeType="withEffect">
+                                  <p:stCondLst>
+                                    <p:cond delay="0"/>
+                                  </p:stCondLst>
+                                  <p:childTnLst>
+                                    <p:set>
+                                      <p:cBhvr>
+                                        <p:cTn id="12" dur="1" fill="hold">
+                                          <p:stCondLst>
+                                            <p:cond delay="0"/>
+                                          </p:stCondLst>
+                                        </p:cTn>
+                                        <p:tgtEl>
+                                          <p:spTgt spid="18"/>
+                                        </p:tgtEl>
+                                        <p:attrNameLst>
+                                          <p:attrName>style.visibility</p:attrName>
+                                        </p:attrNameLst>
+                                      </p:cBhvr>
+                                      <p:to>
+                                        <p:strVal val="visible"/>
+                                      </p:to>
+                                    </p:set>
+                                    <p:animEffect transition="in" filter="fade">
+                                      <p:cBhvr>
+                                        <p:cTn id="13" dur="500"/>
+                                        <p:tgtEl>
+                                          <p:spTgt spid="18"/>
+                                        </p:tgtEl>
+                                      </p:cBhvr>
+                                    </p:animEffect>
+                                  </p:childTnLst>
+                                </p:cTn>
+                              </p:par>
                             </p:childTnLst>
                           </p:cTn>
                         </p:par>
@@ -3553,26 +3624,26 @@
                     </p:cTn>
                   </p:par>
                   <p:par>
-                    <p:cTn id="8" fill="hold">
+                    <p:cTn id="14" fill="hold">
                       <p:stCondLst>
                         <p:cond delay="indefinite"/>
                       </p:stCondLst>
                       <p:childTnLst>
                         <p:par>
-                          <p:cTn id="9" fill="hold">
+                          <p:cTn id="15" fill="hold">
                             <p:stCondLst>
                               <p:cond delay="0"/>
                             </p:stCondLst>
                             <p:childTnLst>
                               <p:par>
-                                <p:cTn id="10" presetID="10" presetClass="entr" presetSubtype="0" fill="hold" nodeType="clickEffect">
+                                <p:cTn id="16" presetID="10" presetClass="entr" presetSubtype="0" fill="hold" nodeType="clickEffect">
                                   <p:stCondLst>
                                     <p:cond delay="0"/>
                                   </p:stCondLst>
                                   <p:childTnLst>
                                     <p:set>
                                       <p:cBhvr>
-                                        <p:cTn id="11" dur="1" fill="hold">
+                                        <p:cTn id="17" dur="1" fill="hold">
                                           <p:stCondLst>
                                             <p:cond delay="0"/>
                                           </p:stCondLst>
@@ -3590,7 +3661,7 @@
                                     </p:set>
                                     <p:animEffect transition="in" filter="fade">
                                       <p:cBhvr>
-                                        <p:cTn id="12" dur="500"/>
+                                        <p:cTn id="18" dur="500"/>
                                         <p:tgtEl>
                                           <p:spTgt spid="15"/>
                                         </p:tgtEl>
@@ -3606,26 +3677,26 @@
                     </p:cTn>
                   </p:par>
                   <p:par>
-                    <p:cTn id="13" fill="hold">
+                    <p:cTn id="19" fill="hold">
                       <p:stCondLst>
                         <p:cond delay="indefinite"/>
                       </p:stCondLst>
                       <p:childTnLst>
                         <p:par>
-                          <p:cTn id="14" fill="hold">
+                          <p:cTn id="20" fill="hold">
                             <p:stCondLst>
                               <p:cond delay="0"/>
                             </p:stCondLst>
                             <p:childTnLst>
                               <p:par>
-                                <p:cTn id="15" presetID="10" presetClass="entr" presetSubtype="0" fill="hold" grpId="0" nodeType="clickEffect">
+                                <p:cTn id="21" presetID="10" presetClass="entr" presetSubtype="0" fill="hold" grpId="0" nodeType="clickEffect">
                                   <p:stCondLst>
                                     <p:cond delay="0"/>
                                   </p:stCondLst>
                                   <p:childTnLst>
                                     <p:set>
                                       <p:cBhvr>
-                                        <p:cTn id="16" dur="1" fill="hold">
+                                        <p:cTn id="22" dur="1" fill="hold">
                                           <p:stCondLst>
                                             <p:cond delay="0"/>
                                           </p:stCondLst>
@@ -3643,7 +3714,7 @@
                                     </p:set>
                                     <p:animEffect transition="in" filter="fade">
                                       <p:cBhvr>
-                                        <p:cTn id="17" dur="500"/>
+                                        <p:cTn id="23" dur="500"/>
                                         <p:tgtEl>
                                           <p:spTgt spid="6"/>
                                         </p:tgtEl>
@@ -3659,26 +3730,26 @@
                     </p:cTn>
                   </p:par>
                   <p:par>
-                    <p:cTn id="18" fill="hold">
+                    <p:cTn id="24" fill="hold">
                       <p:stCondLst>
                         <p:cond delay="indefinite"/>
                       </p:stCondLst>
                       <p:childTnLst>
                         <p:par>
-                          <p:cTn id="19" fill="hold">
+                          <p:cTn id="25" fill="hold">
                             <p:stCondLst>
                               <p:cond delay="0"/>
                             </p:stCondLst>
                             <p:childTnLst>
                               <p:par>
-                                <p:cTn id="20" presetID="10" presetClass="entr" presetSubtype="0" fill="hold" grpId="0" nodeType="clickEffect">
+                                <p:cTn id="26" presetID="10" presetClass="entr" presetSubtype="0" fill="hold" grpId="0" nodeType="clickEffect">
                                   <p:stCondLst>
                                     <p:cond delay="0"/>
                                   </p:stCondLst>
                                   <p:childTnLst>
                                     <p:set>
                                       <p:cBhvr>
-                                        <p:cTn id="21" dur="1" fill="hold">
+                                        <p:cTn id="27" dur="1" fill="hold">
                                           <p:stCondLst>
                                             <p:cond delay="0"/>
                                           </p:stCondLst>
@@ -3696,7 +3767,7 @@
                                     </p:set>
                                     <p:animEffect transition="in" filter="fade">
                                       <p:cBhvr>
-                                        <p:cTn id="22" dur="500"/>
+                                        <p:cTn id="28" dur="500"/>
                                         <p:tgtEl>
                                           <p:spTgt spid="12"/>
                                         </p:tgtEl>
@@ -3712,26 +3783,26 @@
                     </p:cTn>
                   </p:par>
                   <p:par>
-                    <p:cTn id="23" fill="hold">
+                    <p:cTn id="29" fill="hold">
                       <p:stCondLst>
                         <p:cond delay="indefinite"/>
                       </p:stCondLst>
                       <p:childTnLst>
                         <p:par>
-                          <p:cTn id="24" fill="hold">
+                          <p:cTn id="30" fill="hold">
                             <p:stCondLst>
                               <p:cond delay="0"/>
                             </p:stCondLst>
                             <p:childTnLst>
                               <p:par>
-                                <p:cTn id="25" presetID="10" presetClass="entr" presetSubtype="0" fill="hold" grpId="0" nodeType="clickEffect">
+                                <p:cTn id="31" presetID="10" presetClass="entr" presetSubtype="0" fill="hold" grpId="0" nodeType="clickEffect">
                                   <p:stCondLst>
                                     <p:cond delay="0"/>
                                   </p:stCondLst>
                                   <p:childTnLst>
                                     <p:set>
                                       <p:cBhvr>
-                                        <p:cTn id="26" dur="1" fill="hold">
+                                        <p:cTn id="32" dur="1" fill="hold">
                                           <p:stCondLst>
                                             <p:cond delay="0"/>
                                           </p:stCondLst>
@@ -3749,7 +3820,7 @@
                                     </p:set>
                                     <p:animEffect transition="in" filter="fade">
                                       <p:cBhvr>
-                                        <p:cTn id="27" dur="500"/>
+                                        <p:cTn id="33" dur="500"/>
                                         <p:tgtEl>
                                           <p:spTgt spid="11"/>
                                         </p:tgtEl>
@@ -3765,26 +3836,26 @@
                     </p:cTn>
                   </p:par>
                   <p:par>
-                    <p:cTn id="28" fill="hold">
+                    <p:cTn id="34" fill="hold">
                       <p:stCondLst>
                         <p:cond delay="indefinite"/>
                       </p:stCondLst>
                       <p:childTnLst>
                         <p:par>
-                          <p:cTn id="29" fill="hold">
+                          <p:cTn id="35" fill="hold">
                             <p:stCondLst>
                               <p:cond delay="0"/>
                             </p:stCondLst>
                             <p:childTnLst>
                               <p:par>
-                                <p:cTn id="30" presetID="10" presetClass="entr" presetSubtype="0" fill="hold" grpId="0" nodeType="clickEffect">
+                                <p:cTn id="36" presetID="10" presetClass="entr" presetSubtype="0" fill="hold" grpId="0" nodeType="clickEffect">
                                   <p:stCondLst>
                                     <p:cond delay="0"/>
                                   </p:stCondLst>
                                   <p:childTnLst>
                                     <p:set>
                                       <p:cBhvr>
-                                        <p:cTn id="31" dur="1" fill="hold">
+                                        <p:cTn id="37" dur="1" fill="hold">
                                           <p:stCondLst>
                                             <p:cond delay="0"/>
                                           </p:stCondLst>
@@ -3802,7 +3873,7 @@
                                     </p:set>
                                     <p:animEffect transition="in" filter="fade">
                                       <p:cBhvr>
-                                        <p:cTn id="32" dur="500"/>
+                                        <p:cTn id="38" dur="500"/>
                                         <p:tgtEl>
                                           <p:spTgt spid="10"/>
                                         </p:tgtEl>
@@ -3818,26 +3889,26 @@
                     </p:cTn>
                   </p:par>
                   <p:par>
-                    <p:cTn id="33" fill="hold">
+                    <p:cTn id="39" fill="hold">
                       <p:stCondLst>
                         <p:cond delay="indefinite"/>
                       </p:stCondLst>
                       <p:childTnLst>
                         <p:par>
-                          <p:cTn id="34" fill="hold">
+                          <p:cTn id="40" fill="hold">
                             <p:stCondLst>
                               <p:cond delay="0"/>
                             </p:stCondLst>
                             <p:childTnLst>
                               <p:par>
-                                <p:cTn id="35" presetID="10" presetClass="entr" presetSubtype="0" fill="hold" grpId="0" nodeType="clickEffect">
+                                <p:cTn id="41" presetID="10" presetClass="entr" presetSubtype="0" fill="hold" grpId="0" nodeType="clickEffect">
                                   <p:stCondLst>
                                     <p:cond delay="0"/>
                                   </p:stCondLst>
                                   <p:childTnLst>
                                     <p:set>
                                       <p:cBhvr>
-                                        <p:cTn id="36" dur="1" fill="hold">
+                                        <p:cTn id="42" dur="1" fill="hold">
                                           <p:stCondLst>
                                             <p:cond delay="0"/>
                                           </p:stCondLst>
@@ -3855,7 +3926,7 @@
                                     </p:set>
                                     <p:animEffect transition="in" filter="fade">
                                       <p:cBhvr>
-                                        <p:cTn id="37" dur="500"/>
+                                        <p:cTn id="43" dur="500"/>
                                         <p:tgtEl>
                                           <p:spTgt spid="13"/>
                                         </p:tgtEl>
@@ -3897,7 +3968,83 @@
       <p:bldP spid="11" grpId="0"/>
       <p:bldP spid="12" grpId="0"/>
       <p:bldP spid="13" grpId="0"/>
+      <p:bldP spid="18" grpId="0"/>
     </p:bldLst>
+  </p:timing>
+</p:sld>
+</file>
+
+<file path=ppt/slides/slide2.xml><?xml version="1.0" encoding="utf-8"?>
+<p:sld xmlns:a="http://schemas.openxmlformats.org/drawingml/2006/main" xmlns:r="http://schemas.openxmlformats.org/officeDocument/2006/relationships" xmlns:p="http://schemas.openxmlformats.org/presentationml/2006/main">
+  <p:cSld>
+    <p:spTree>
+      <p:nvGrpSpPr>
+        <p:cNvPr id="1" name=""/>
+        <p:cNvGrpSpPr/>
+        <p:nvPr/>
+      </p:nvGrpSpPr>
+      <p:grpSpPr>
+        <a:xfrm>
+          <a:off x="0" y="0"/>
+          <a:ext cx="0" cy="0"/>
+          <a:chOff x="0" y="0"/>
+          <a:chExt cx="0" cy="0"/>
+        </a:xfrm>
+      </p:grpSpPr>
+      <p:sp>
+        <p:nvSpPr>
+          <p:cNvPr id="2" name="Titre 1"/>
+          <p:cNvSpPr>
+            <a:spLocks noGrp="1"/>
+          </p:cNvSpPr>
+          <p:nvPr>
+            <p:ph type="title"/>
+          </p:nvPr>
+        </p:nvSpPr>
+        <p:spPr/>
+        <p:txBody>
+          <a:bodyPr/>
+          <a:lstStyle/>
+          <a:p>
+            <a:endParaRPr lang="fr-FR"/>
+          </a:p>
+        </p:txBody>
+      </p:sp>
+      <p:sp>
+        <p:nvSpPr>
+          <p:cNvPr id="3" name="Espace réservé du contenu 2"/>
+          <p:cNvSpPr>
+            <a:spLocks noGrp="1"/>
+          </p:cNvSpPr>
+          <p:nvPr>
+            <p:ph idx="1"/>
+          </p:nvPr>
+        </p:nvSpPr>
+        <p:spPr/>
+        <p:txBody>
+          <a:bodyPr/>
+          <a:lstStyle/>
+          <a:p>
+            <a:endParaRPr lang="fr-FR"/>
+          </a:p>
+        </p:txBody>
+      </p:sp>
+    </p:spTree>
+    <p:extLst>
+      <p:ext uri="{BB962C8B-B14F-4D97-AF65-F5344CB8AC3E}">
+        <p14:creationId xmlns:p14="http://schemas.microsoft.com/office/powerpoint/2010/main" val="1078602476"/>
+      </p:ext>
+    </p:extLst>
+  </p:cSld>
+  <p:clrMapOvr>
+    <a:masterClrMapping/>
+  </p:clrMapOvr>
+  <p:timing>
+    <p:tnLst>
+      <p:par>
+        <p:cTn id="1" dur="indefinite" restart="never" nodeType="tmRoot"/>
+      </p:par>
+    </p:tnLst>
   </p:timing>
 </p:sld>
 </file>

</xml_diff>